<commit_message>
Update doc and pptx
</commit_message>
<xml_diff>
--- a/EAI6980_Craig_Perkins_Presentation.pptx
+++ b/EAI6980_Craig_Perkins_Presentation.pptx
@@ -8,14 +8,15 @@
     <p:sldMasterId id="2147483724" r:id="rId7"/>
   </p:sldMasterIdLst>
   <p:notesMasterIdLst>
-    <p:notesMasterId r:id="rId10"/>
+    <p:notesMasterId r:id="rId11"/>
   </p:notesMasterIdLst>
   <p:handoutMasterIdLst>
-    <p:handoutMasterId r:id="rId11"/>
+    <p:handoutMasterId r:id="rId12"/>
   </p:handoutMasterIdLst>
   <p:sldIdLst>
     <p:sldId id="446" r:id="rId8"/>
     <p:sldId id="466" r:id="rId9"/>
+    <p:sldId id="467" r:id="rId10"/>
   </p:sldIdLst>
   <p:sldSz cx="12192000" cy="6858000"/>
   <p:notesSz cx="6858000" cy="9144000"/>
@@ -7732,6 +7733,750 @@
     <p:extLst>
       <p:ext uri="{BB962C8B-B14F-4D97-AF65-F5344CB8AC3E}">
         <p14:creationId xmlns:p14="http://schemas.microsoft.com/office/powerpoint/2010/main" val="3299039514"/>
+      </p:ext>
+    </p:extLst>
+  </p:cSld>
+  <p:clrMapOvr>
+    <a:masterClrMapping/>
+  </p:clrMapOvr>
+</p:sld>
+</file>
+
+<file path=ppt/slides/slide3.xml><?xml version="1.0" encoding="utf-8"?>
+<p:sld xmlns:a="http://schemas.openxmlformats.org/drawingml/2006/main" xmlns:r="http://schemas.openxmlformats.org/officeDocument/2006/relationships" xmlns:p="http://schemas.openxmlformats.org/presentationml/2006/main">
+  <p:cSld>
+    <p:bg>
+      <p:bgPr>
+        <a:solidFill>
+          <a:schemeClr val="bg1"/>
+        </a:solidFill>
+        <a:effectLst/>
+      </p:bgPr>
+    </p:bg>
+    <p:spTree>
+      <p:nvGrpSpPr>
+        <p:cNvPr id="1" name=""/>
+        <p:cNvGrpSpPr/>
+        <p:nvPr/>
+      </p:nvGrpSpPr>
+      <p:grpSpPr>
+        <a:xfrm>
+          <a:off x="0" y="0"/>
+          <a:ext cx="0" cy="0"/>
+          <a:chOff x="0" y="0"/>
+          <a:chExt cx="0" cy="0"/>
+        </a:xfrm>
+      </p:grpSpPr>
+      <p:sp useBgFill="1">
+        <p:nvSpPr>
+          <p:cNvPr id="10" name="Rectangle 9">
+            <a:extLst>
+              <a:ext uri="{FF2B5EF4-FFF2-40B4-BE49-F238E27FC236}">
+                <a16:creationId xmlns:a16="http://schemas.microsoft.com/office/drawing/2014/main" id="{F13C74B1-5B17-4795-BED0-7140497B445A}"/>
+              </a:ext>
+              <a:ext uri="{C183D7F6-B498-43B3-948B-1728B52AA6E4}">
+                <adec:decorative xmlns:adec="http://schemas.microsoft.com/office/drawing/2017/decorative" val="1"/>
+              </a:ext>
+            </a:extLst>
+          </p:cNvPr>
+          <p:cNvSpPr>
+            <a:spLocks noGrp="1" noRot="1" noChangeAspect="1" noMove="1" noResize="1" noEditPoints="1" noAdjustHandles="1" noChangeArrowheads="1" noChangeShapeType="1" noTextEdit="1"/>
+          </p:cNvSpPr>
+          <p:nvPr>
+            <p:extLst>
+              <p:ext uri="{386F3935-93C4-4BCD-93E2-E3B085C9AB24}">
+                <p16:designElem xmlns:p16="http://schemas.microsoft.com/office/powerpoint/2015/main" val="1"/>
+              </p:ext>
+            </p:extLst>
+          </p:nvPr>
+        </p:nvSpPr>
+        <p:spPr>
+          <a:xfrm>
+            <a:off x="0" y="0"/>
+            <a:ext cx="12188952" cy="6858000"/>
+          </a:xfrm>
+          <a:prstGeom prst="rect">
+            <a:avLst/>
+          </a:prstGeom>
+          <a:ln>
+            <a:noFill/>
+          </a:ln>
+        </p:spPr>
+        <p:style>
+          <a:lnRef idx="2">
+            <a:schemeClr val="accent1">
+              <a:shade val="50000"/>
+            </a:schemeClr>
+          </a:lnRef>
+          <a:fillRef idx="1">
+            <a:schemeClr val="accent1"/>
+          </a:fillRef>
+          <a:effectRef idx="0">
+            <a:schemeClr val="accent1"/>
+          </a:effectRef>
+          <a:fontRef idx="minor">
+            <a:schemeClr val="lt1"/>
+          </a:fontRef>
+        </p:style>
+        <p:txBody>
+          <a:bodyPr rtlCol="0" anchor="ctr"/>
+          <a:lstStyle/>
+          <a:p>
+            <a:pPr algn="ctr"/>
+            <a:endParaRPr lang="en-US"/>
+          </a:p>
+        </p:txBody>
+      </p:sp>
+      <p:sp>
+        <p:nvSpPr>
+          <p:cNvPr id="2" name="Title 1">
+            <a:extLst>
+              <a:ext uri="{FF2B5EF4-FFF2-40B4-BE49-F238E27FC236}">
+                <a16:creationId xmlns:a16="http://schemas.microsoft.com/office/drawing/2014/main" id="{558B8998-11EC-DD48-97FA-57329B9BF2CE}"/>
+              </a:ext>
+            </a:extLst>
+          </p:cNvPr>
+          <p:cNvSpPr>
+            <a:spLocks noGrp="1"/>
+          </p:cNvSpPr>
+          <p:nvPr>
+            <p:ph type="title"/>
+          </p:nvPr>
+        </p:nvSpPr>
+        <p:spPr>
+          <a:xfrm>
+            <a:off x="640080" y="325369"/>
+            <a:ext cx="4368602" cy="1956841"/>
+          </a:xfrm>
+        </p:spPr>
+        <p:txBody>
+          <a:bodyPr vert="horz" lIns="91440" tIns="45720" rIns="91440" bIns="45720" rtlCol="0" anchor="b">
+            <a:normAutofit/>
+          </a:bodyPr>
+          <a:lstStyle/>
+          <a:p>
+            <a:r>
+              <a:rPr lang="en-US" sz="5400" dirty="0"/>
+              <a:t>Dataset</a:t>
+            </a:r>
+          </a:p>
+        </p:txBody>
+      </p:sp>
+      <p:sp>
+        <p:nvSpPr>
+          <p:cNvPr id="12" name="sketchy line">
+            <a:extLst>
+              <a:ext uri="{FF2B5EF4-FFF2-40B4-BE49-F238E27FC236}">
+                <a16:creationId xmlns:a16="http://schemas.microsoft.com/office/drawing/2014/main" id="{D4974D33-8DC5-464E-8C6D-BE58F0669C17}"/>
+              </a:ext>
+              <a:ext uri="{C183D7F6-B498-43B3-948B-1728B52AA6E4}">
+                <adec:decorative xmlns:adec="http://schemas.microsoft.com/office/drawing/2017/decorative" val="1"/>
+              </a:ext>
+            </a:extLst>
+          </p:cNvPr>
+          <p:cNvSpPr>
+            <a:spLocks noGrp="1" noRot="1" noChangeAspect="1" noMove="1" noResize="1" noEditPoints="1" noAdjustHandles="1" noChangeArrowheads="1" noChangeShapeType="1" noTextEdit="1"/>
+          </p:cNvSpPr>
+          <p:nvPr>
+            <p:extLst>
+              <p:ext uri="{386F3935-93C4-4BCD-93E2-E3B085C9AB24}">
+                <p16:designElem xmlns:p16="http://schemas.microsoft.com/office/powerpoint/2015/main" val="1"/>
+              </p:ext>
+            </p:extLst>
+          </p:nvPr>
+        </p:nvSpPr>
+        <p:spPr>
+          <a:xfrm>
+            <a:off x="640080" y="2586994"/>
+            <a:ext cx="3474720" cy="18288"/>
+          </a:xfrm>
+          <a:custGeom>
+            <a:avLst/>
+            <a:gdLst>
+              <a:gd name="connsiteX0" fmla="*/ 0 w 3474720"/>
+              <a:gd name="connsiteY0" fmla="*/ 0 h 18288"/>
+              <a:gd name="connsiteX1" fmla="*/ 694944 w 3474720"/>
+              <a:gd name="connsiteY1" fmla="*/ 0 h 18288"/>
+              <a:gd name="connsiteX2" fmla="*/ 1355141 w 3474720"/>
+              <a:gd name="connsiteY2" fmla="*/ 0 h 18288"/>
+              <a:gd name="connsiteX3" fmla="*/ 2015338 w 3474720"/>
+              <a:gd name="connsiteY3" fmla="*/ 0 h 18288"/>
+              <a:gd name="connsiteX4" fmla="*/ 2779776 w 3474720"/>
+              <a:gd name="connsiteY4" fmla="*/ 0 h 18288"/>
+              <a:gd name="connsiteX5" fmla="*/ 3474720 w 3474720"/>
+              <a:gd name="connsiteY5" fmla="*/ 0 h 18288"/>
+              <a:gd name="connsiteX6" fmla="*/ 3474720 w 3474720"/>
+              <a:gd name="connsiteY6" fmla="*/ 18288 h 18288"/>
+              <a:gd name="connsiteX7" fmla="*/ 2779776 w 3474720"/>
+              <a:gd name="connsiteY7" fmla="*/ 18288 h 18288"/>
+              <a:gd name="connsiteX8" fmla="*/ 2189074 w 3474720"/>
+              <a:gd name="connsiteY8" fmla="*/ 18288 h 18288"/>
+              <a:gd name="connsiteX9" fmla="*/ 1528877 w 3474720"/>
+              <a:gd name="connsiteY9" fmla="*/ 18288 h 18288"/>
+              <a:gd name="connsiteX10" fmla="*/ 868680 w 3474720"/>
+              <a:gd name="connsiteY10" fmla="*/ 18288 h 18288"/>
+              <a:gd name="connsiteX11" fmla="*/ 0 w 3474720"/>
+              <a:gd name="connsiteY11" fmla="*/ 18288 h 18288"/>
+              <a:gd name="connsiteX12" fmla="*/ 0 w 3474720"/>
+              <a:gd name="connsiteY12" fmla="*/ 0 h 18288"/>
+            </a:gdLst>
+            <a:ahLst/>
+            <a:cxnLst>
+              <a:cxn ang="0">
+                <a:pos x="connsiteX0" y="connsiteY0"/>
+              </a:cxn>
+              <a:cxn ang="0">
+                <a:pos x="connsiteX1" y="connsiteY1"/>
+              </a:cxn>
+              <a:cxn ang="0">
+                <a:pos x="connsiteX2" y="connsiteY2"/>
+              </a:cxn>
+              <a:cxn ang="0">
+                <a:pos x="connsiteX3" y="connsiteY3"/>
+              </a:cxn>
+              <a:cxn ang="0">
+                <a:pos x="connsiteX4" y="connsiteY4"/>
+              </a:cxn>
+              <a:cxn ang="0">
+                <a:pos x="connsiteX5" y="connsiteY5"/>
+              </a:cxn>
+              <a:cxn ang="0">
+                <a:pos x="connsiteX6" y="connsiteY6"/>
+              </a:cxn>
+              <a:cxn ang="0">
+                <a:pos x="connsiteX7" y="connsiteY7"/>
+              </a:cxn>
+              <a:cxn ang="0">
+                <a:pos x="connsiteX8" y="connsiteY8"/>
+              </a:cxn>
+              <a:cxn ang="0">
+                <a:pos x="connsiteX9" y="connsiteY9"/>
+              </a:cxn>
+              <a:cxn ang="0">
+                <a:pos x="connsiteX10" y="connsiteY10"/>
+              </a:cxn>
+              <a:cxn ang="0">
+                <a:pos x="connsiteX11" y="connsiteY11"/>
+              </a:cxn>
+              <a:cxn ang="0">
+                <a:pos x="connsiteX12" y="connsiteY12"/>
+              </a:cxn>
+            </a:cxnLst>
+            <a:rect l="l" t="t" r="r" b="b"/>
+            <a:pathLst>
+              <a:path w="3474720" h="18288" fill="none" extrusionOk="0">
+                <a:moveTo>
+                  <a:pt x="0" y="0"/>
+                </a:moveTo>
+                <a:cubicBezTo>
+                  <a:pt x="224454" y="-14544"/>
+                  <a:pt x="495407" y="26540"/>
+                  <a:pt x="694944" y="0"/>
+                </a:cubicBezTo>
+                <a:cubicBezTo>
+                  <a:pt x="894481" y="-26540"/>
+                  <a:pt x="1130063" y="24713"/>
+                  <a:pt x="1355141" y="0"/>
+                </a:cubicBezTo>
+                <a:cubicBezTo>
+                  <a:pt x="1580219" y="-24713"/>
+                  <a:pt x="1820099" y="26695"/>
+                  <a:pt x="2015338" y="0"/>
+                </a:cubicBezTo>
+                <a:cubicBezTo>
+                  <a:pt x="2210577" y="-26695"/>
+                  <a:pt x="2402045" y="165"/>
+                  <a:pt x="2779776" y="0"/>
+                </a:cubicBezTo>
+                <a:cubicBezTo>
+                  <a:pt x="3157507" y="-165"/>
+                  <a:pt x="3286859" y="-15571"/>
+                  <a:pt x="3474720" y="0"/>
+                </a:cubicBezTo>
+                <a:cubicBezTo>
+                  <a:pt x="3474286" y="7551"/>
+                  <a:pt x="3474253" y="9822"/>
+                  <a:pt x="3474720" y="18288"/>
+                </a:cubicBezTo>
+                <a:cubicBezTo>
+                  <a:pt x="3233904" y="29845"/>
+                  <a:pt x="2945134" y="-5256"/>
+                  <a:pt x="2779776" y="18288"/>
+                </a:cubicBezTo>
+                <a:cubicBezTo>
+                  <a:pt x="2614418" y="41832"/>
+                  <a:pt x="2339768" y="22709"/>
+                  <a:pt x="2189074" y="18288"/>
+                </a:cubicBezTo>
+                <a:cubicBezTo>
+                  <a:pt x="2038380" y="13867"/>
+                  <a:pt x="1817434" y="-4947"/>
+                  <a:pt x="1528877" y="18288"/>
+                </a:cubicBezTo>
+                <a:cubicBezTo>
+                  <a:pt x="1240320" y="41523"/>
+                  <a:pt x="1042447" y="37198"/>
+                  <a:pt x="868680" y="18288"/>
+                </a:cubicBezTo>
+                <a:cubicBezTo>
+                  <a:pt x="694913" y="-622"/>
+                  <a:pt x="233232" y="44909"/>
+                  <a:pt x="0" y="18288"/>
+                </a:cubicBezTo>
+                <a:cubicBezTo>
+                  <a:pt x="60" y="11696"/>
+                  <a:pt x="66" y="3758"/>
+                  <a:pt x="0" y="0"/>
+                </a:cubicBezTo>
+                <a:close/>
+              </a:path>
+              <a:path w="3474720" h="18288" stroke="0" extrusionOk="0">
+                <a:moveTo>
+                  <a:pt x="0" y="0"/>
+                </a:moveTo>
+                <a:cubicBezTo>
+                  <a:pt x="202328" y="-14716"/>
+                  <a:pt x="332722" y="-11499"/>
+                  <a:pt x="625450" y="0"/>
+                </a:cubicBezTo>
+                <a:cubicBezTo>
+                  <a:pt x="918178" y="11499"/>
+                  <a:pt x="1096688" y="5123"/>
+                  <a:pt x="1389888" y="0"/>
+                </a:cubicBezTo>
+                <a:cubicBezTo>
+                  <a:pt x="1683088" y="-5123"/>
+                  <a:pt x="1835981" y="-14038"/>
+                  <a:pt x="1980590" y="0"/>
+                </a:cubicBezTo>
+                <a:cubicBezTo>
+                  <a:pt x="2125199" y="14038"/>
+                  <a:pt x="2396099" y="-7203"/>
+                  <a:pt x="2571293" y="0"/>
+                </a:cubicBezTo>
+                <a:cubicBezTo>
+                  <a:pt x="2746487" y="7203"/>
+                  <a:pt x="3041609" y="-12036"/>
+                  <a:pt x="3474720" y="0"/>
+                </a:cubicBezTo>
+                <a:cubicBezTo>
+                  <a:pt x="3474638" y="4406"/>
+                  <a:pt x="3474631" y="9982"/>
+                  <a:pt x="3474720" y="18288"/>
+                </a:cubicBezTo>
+                <a:cubicBezTo>
+                  <a:pt x="3324873" y="21876"/>
+                  <a:pt x="3136771" y="12587"/>
+                  <a:pt x="2814523" y="18288"/>
+                </a:cubicBezTo>
+                <a:cubicBezTo>
+                  <a:pt x="2492275" y="23989"/>
+                  <a:pt x="2294402" y="47111"/>
+                  <a:pt x="2154326" y="18288"/>
+                </a:cubicBezTo>
+                <a:cubicBezTo>
+                  <a:pt x="2014250" y="-10535"/>
+                  <a:pt x="1820317" y="33903"/>
+                  <a:pt x="1494130" y="18288"/>
+                </a:cubicBezTo>
+                <a:cubicBezTo>
+                  <a:pt x="1167943" y="2673"/>
+                  <a:pt x="948432" y="14868"/>
+                  <a:pt x="729691" y="18288"/>
+                </a:cubicBezTo>
+                <a:cubicBezTo>
+                  <a:pt x="510950" y="21708"/>
+                  <a:pt x="264032" y="24354"/>
+                  <a:pt x="0" y="18288"/>
+                </a:cubicBezTo>
+                <a:cubicBezTo>
+                  <a:pt x="189" y="14288"/>
+                  <a:pt x="-703" y="3747"/>
+                  <a:pt x="0" y="0"/>
+                </a:cubicBezTo>
+                <a:close/>
+              </a:path>
+            </a:pathLst>
+          </a:custGeom>
+          <a:solidFill>
+            <a:schemeClr val="accent2"/>
+          </a:solidFill>
+          <a:ln w="44450" cap="rnd">
+            <a:solidFill>
+              <a:schemeClr val="accent2"/>
+            </a:solidFill>
+            <a:round/>
+            <a:extLst>
+              <a:ext uri="{C807C97D-BFC1-408E-A445-0C87EB9F89A2}">
+                <ask:lineSketchStyleProps xmlns:ask="http://schemas.microsoft.com/office/drawing/2018/sketchyshapes" sd="2863741219">
+                  <a:prstGeom prst="rect">
+                    <a:avLst/>
+                  </a:prstGeom>
+                  <ask:type>
+                    <ask:lineSketchFreehand/>
+                  </ask:type>
+                </ask:lineSketchStyleProps>
+              </a:ext>
+            </a:extLst>
+          </a:ln>
+        </p:spPr>
+        <p:style>
+          <a:lnRef idx="2">
+            <a:schemeClr val="accent1">
+              <a:shade val="50000"/>
+            </a:schemeClr>
+          </a:lnRef>
+          <a:fillRef idx="1">
+            <a:schemeClr val="accent1"/>
+          </a:fillRef>
+          <a:effectRef idx="0">
+            <a:schemeClr val="accent1"/>
+          </a:effectRef>
+          <a:fontRef idx="minor">
+            <a:schemeClr val="lt1"/>
+          </a:fontRef>
+        </p:style>
+        <p:txBody>
+          <a:bodyPr rtlCol="0" anchor="ctr"/>
+          <a:lstStyle/>
+          <a:p>
+            <a:pPr algn="ctr"/>
+            <a:endParaRPr lang="en-US"/>
+          </a:p>
+        </p:txBody>
+      </p:sp>
+      <p:sp>
+        <p:nvSpPr>
+          <p:cNvPr id="5" name="TextBox 4">
+            <a:extLst>
+              <a:ext uri="{FF2B5EF4-FFF2-40B4-BE49-F238E27FC236}">
+                <a16:creationId xmlns:a16="http://schemas.microsoft.com/office/drawing/2014/main" id="{975506FE-385E-9E6A-3552-D7598862C237}"/>
+              </a:ext>
+            </a:extLst>
+          </p:cNvPr>
+          <p:cNvSpPr txBox="1"/>
+          <p:nvPr/>
+        </p:nvSpPr>
+        <p:spPr>
+          <a:xfrm>
+            <a:off x="640080" y="2872899"/>
+            <a:ext cx="4243589" cy="3320668"/>
+          </a:xfrm>
+          <a:prstGeom prst="rect">
+            <a:avLst/>
+          </a:prstGeom>
+        </p:spPr>
+        <p:txBody>
+          <a:bodyPr rot="0" spcFirstLastPara="0" vertOverflow="overflow" horzOverflow="overflow" vert="horz" lIns="91440" tIns="45720" rIns="91440" bIns="45720" numCol="1" spcCol="0" rtlCol="0" fromWordArt="0" anchorCtr="0" forceAA="0" compatLnSpc="1">
+            <a:prstTxWarp prst="textNoShape">
+              <a:avLst/>
+            </a:prstTxWarp>
+            <a:normAutofit lnSpcReduction="10000"/>
+          </a:bodyPr>
+          <a:lstStyle/>
+          <a:p>
+            <a:pPr indent="-228600">
+              <a:lnSpc>
+                <a:spcPct val="90000"/>
+              </a:lnSpc>
+              <a:spcAft>
+                <a:spcPts val="600"/>
+              </a:spcAft>
+              <a:buFont typeface="Arial" panose="020B0604020202020204" pitchFamily="34" charset="0"/>
+              <a:buChar char="•"/>
+            </a:pPr>
+            <a:r>
+              <a:rPr lang="en-US" sz="1500" dirty="0"/>
+              <a:t>UNSW-NB15 Dataset from University of South Wales</a:t>
+            </a:r>
+          </a:p>
+          <a:p>
+            <a:pPr indent="-228600">
+              <a:lnSpc>
+                <a:spcPct val="90000"/>
+              </a:lnSpc>
+              <a:spcAft>
+                <a:spcPts val="600"/>
+              </a:spcAft>
+              <a:buFont typeface="Arial" panose="020B0604020202020204" pitchFamily="34" charset="0"/>
+              <a:buChar char="•"/>
+            </a:pPr>
+            <a:endParaRPr lang="en-US" sz="1500" dirty="0"/>
+          </a:p>
+          <a:p>
+            <a:pPr indent="-228600">
+              <a:lnSpc>
+                <a:spcPct val="90000"/>
+              </a:lnSpc>
+              <a:spcAft>
+                <a:spcPts val="600"/>
+              </a:spcAft>
+              <a:buFont typeface="Arial" panose="020B0604020202020204" pitchFamily="34" charset="0"/>
+              <a:buChar char="•"/>
+            </a:pPr>
+            <a:r>
+              <a:rPr lang="en-US" sz="1500" dirty="0"/>
+              <a:t>Originates from 100GB of raw </a:t>
+            </a:r>
+            <a:r>
+              <a:rPr lang="en-US" sz="1500" dirty="0" err="1"/>
+              <a:t>tcpdump</a:t>
+            </a:r>
+            <a:r>
+              <a:rPr lang="en-US" sz="1500" dirty="0"/>
+              <a:t> data</a:t>
+            </a:r>
+          </a:p>
+          <a:p>
+            <a:pPr indent="-228600">
+              <a:lnSpc>
+                <a:spcPct val="90000"/>
+              </a:lnSpc>
+              <a:spcAft>
+                <a:spcPts val="600"/>
+              </a:spcAft>
+              <a:buFont typeface="Arial" panose="020B0604020202020204" pitchFamily="34" charset="0"/>
+              <a:buChar char="•"/>
+            </a:pPr>
+            <a:endParaRPr lang="en-US" sz="1500" dirty="0"/>
+          </a:p>
+          <a:p>
+            <a:pPr indent="-228600">
+              <a:lnSpc>
+                <a:spcPct val="90000"/>
+              </a:lnSpc>
+              <a:spcAft>
+                <a:spcPts val="600"/>
+              </a:spcAft>
+              <a:buFont typeface="Arial" panose="020B0604020202020204" pitchFamily="34" charset="0"/>
+              <a:buChar char="•"/>
+            </a:pPr>
+            <a:r>
+              <a:rPr lang="en-US" sz="1500" dirty="0"/>
+              <a:t>Contains 49 features</a:t>
+            </a:r>
+          </a:p>
+          <a:p>
+            <a:pPr indent="-228600">
+              <a:lnSpc>
+                <a:spcPct val="90000"/>
+              </a:lnSpc>
+              <a:spcAft>
+                <a:spcPts val="600"/>
+              </a:spcAft>
+              <a:buFont typeface="Arial" panose="020B0604020202020204" pitchFamily="34" charset="0"/>
+              <a:buChar char="•"/>
+            </a:pPr>
+            <a:endParaRPr lang="en-US" sz="1500" dirty="0"/>
+          </a:p>
+          <a:p>
+            <a:pPr indent="-228600">
+              <a:lnSpc>
+                <a:spcPct val="90000"/>
+              </a:lnSpc>
+              <a:spcAft>
+                <a:spcPts val="600"/>
+              </a:spcAft>
+              <a:buFont typeface="Arial" panose="020B0604020202020204" pitchFamily="34" charset="0"/>
+              <a:buChar char="•"/>
+            </a:pPr>
+            <a:r>
+              <a:rPr lang="en-US" sz="1500" dirty="0"/>
+              <a:t>Train data set has 175,341 records and test dataset has 82,332 records</a:t>
+            </a:r>
+          </a:p>
+          <a:p>
+            <a:pPr indent="-228600">
+              <a:lnSpc>
+                <a:spcPct val="90000"/>
+              </a:lnSpc>
+              <a:spcAft>
+                <a:spcPts val="600"/>
+              </a:spcAft>
+              <a:buFont typeface="Arial" panose="020B0604020202020204" pitchFamily="34" charset="0"/>
+              <a:buChar char="•"/>
+            </a:pPr>
+            <a:endParaRPr lang="en-US" sz="1500" dirty="0"/>
+          </a:p>
+          <a:p>
+            <a:pPr indent="-228600">
+              <a:lnSpc>
+                <a:spcPct val="90000"/>
+              </a:lnSpc>
+              <a:spcAft>
+                <a:spcPts val="600"/>
+              </a:spcAft>
+              <a:buFont typeface="Arial" panose="020B0604020202020204" pitchFamily="34" charset="0"/>
+              <a:buChar char="•"/>
+            </a:pPr>
+            <a:r>
+              <a:rPr lang="en-US" sz="1500" dirty="0"/>
+              <a:t>H</a:t>
+            </a:r>
+            <a:r>
+              <a:rPr lang="en-US" sz="1500"/>
+              <a:t>as </a:t>
+            </a:r>
+            <a:r>
+              <a:rPr lang="en-US" sz="1500" dirty="0"/>
+              <a:t>nine types of attacks, namely, </a:t>
+            </a:r>
+            <a:r>
+              <a:rPr lang="en-US" sz="1500" dirty="0" err="1"/>
+              <a:t>Fuzzers</a:t>
+            </a:r>
+            <a:r>
+              <a:rPr lang="en-US" sz="1500" dirty="0"/>
+              <a:t>, Analysis, Backdoors, DoS, Exploits, Generic, Reconnaissance, Shellcode and Worms</a:t>
+            </a:r>
+          </a:p>
+        </p:txBody>
+      </p:sp>
+      <p:pic>
+        <p:nvPicPr>
+          <p:cNvPr id="4" name="Picture 3" descr="A person wearing a mask&#10;&#10;Description automatically generated with medium confidence">
+            <a:extLst>
+              <a:ext uri="{FF2B5EF4-FFF2-40B4-BE49-F238E27FC236}">
+                <a16:creationId xmlns:a16="http://schemas.microsoft.com/office/drawing/2014/main" id="{277B5F61-1FCC-949D-24A5-1DE6DACCD5B4}"/>
+              </a:ext>
+            </a:extLst>
+          </p:cNvPr>
+          <p:cNvPicPr>
+            <a:picLocks noChangeAspect="1"/>
+          </p:cNvPicPr>
+          <p:nvPr/>
+        </p:nvPicPr>
+        <p:blipFill rotWithShape="1">
+          <a:blip r:embed="rId2"/>
+          <a:srcRect l="61277" r="6375" b="1"/>
+          <a:stretch/>
+        </p:blipFill>
+        <p:spPr>
+          <a:xfrm>
+            <a:off x="5311702" y="10"/>
+            <a:ext cx="6878775" cy="6857990"/>
+          </a:xfrm>
+          <a:custGeom>
+            <a:avLst/>
+            <a:gdLst/>
+            <a:ahLst/>
+            <a:cxnLst/>
+            <a:rect l="l" t="t" r="r" b="b"/>
+            <a:pathLst>
+              <a:path w="6878775" h="6858000">
+                <a:moveTo>
+                  <a:pt x="1102973" y="0"/>
+                </a:moveTo>
+                <a:lnTo>
+                  <a:pt x="1160688" y="0"/>
+                </a:lnTo>
+                <a:lnTo>
+                  <a:pt x="983189" y="331786"/>
+                </a:lnTo>
+                <a:cubicBezTo>
+                  <a:pt x="914866" y="469145"/>
+                  <a:pt x="850355" y="608712"/>
+                  <a:pt x="789261" y="750263"/>
+                </a:cubicBezTo>
+                <a:cubicBezTo>
+                  <a:pt x="774307" y="784928"/>
+                  <a:pt x="759992" y="819849"/>
+                  <a:pt x="745295" y="854514"/>
+                </a:cubicBezTo>
+                <a:cubicBezTo>
+                  <a:pt x="756682" y="845393"/>
+                  <a:pt x="765489" y="833492"/>
+                  <a:pt x="770857" y="819975"/>
+                </a:cubicBezTo>
+                <a:cubicBezTo>
+                  <a:pt x="879943" y="589569"/>
+                  <a:pt x="999605" y="365513"/>
+                  <a:pt x="1131329" y="148742"/>
+                </a:cubicBezTo>
+                <a:lnTo>
+                  <a:pt x="1227589" y="0"/>
+                </a:lnTo>
+                <a:lnTo>
+                  <a:pt x="6878775" y="0"/>
+                </a:lnTo>
+                <a:lnTo>
+                  <a:pt x="6878775" y="6858000"/>
+                </a:lnTo>
+                <a:lnTo>
+                  <a:pt x="713521" y="6858000"/>
+                </a:lnTo>
+                <a:lnTo>
+                  <a:pt x="625642" y="6670527"/>
+                </a:lnTo>
+                <a:cubicBezTo>
+                  <a:pt x="507232" y="6398531"/>
+                  <a:pt x="403083" y="6118381"/>
+                  <a:pt x="312785" y="5830359"/>
+                </a:cubicBezTo>
+                <a:cubicBezTo>
+                  <a:pt x="278149" y="5719759"/>
+                  <a:pt x="248879" y="5607635"/>
+                  <a:pt x="212198" y="5480401"/>
+                </a:cubicBezTo>
+                <a:cubicBezTo>
+                  <a:pt x="212208" y="5491601"/>
+                  <a:pt x="212803" y="5502788"/>
+                  <a:pt x="213988" y="5513923"/>
+                </a:cubicBezTo>
+                <a:cubicBezTo>
+                  <a:pt x="264089" y="5723695"/>
+                  <a:pt x="307290" y="5935370"/>
+                  <a:pt x="365826" y="6142729"/>
+                </a:cubicBezTo>
+                <a:cubicBezTo>
+                  <a:pt x="433152" y="6380817"/>
+                  <a:pt x="510068" y="6614016"/>
+                  <a:pt x="597975" y="6841549"/>
+                </a:cubicBezTo>
+                <a:lnTo>
+                  <a:pt x="604824" y="6858000"/>
+                </a:lnTo>
+                <a:lnTo>
+                  <a:pt x="552056" y="6858000"/>
+                </a:lnTo>
+                <a:lnTo>
+                  <a:pt x="539576" y="6828295"/>
+                </a:lnTo>
+                <a:cubicBezTo>
+                  <a:pt x="380597" y="6414594"/>
+                  <a:pt x="260223" y="5988893"/>
+                  <a:pt x="171555" y="5552906"/>
+                </a:cubicBezTo>
+                <a:cubicBezTo>
+                  <a:pt x="91163" y="5157998"/>
+                  <a:pt x="43746" y="4758899"/>
+                  <a:pt x="12305" y="4357388"/>
+                </a:cubicBezTo>
+                <a:cubicBezTo>
+                  <a:pt x="-14281" y="4013908"/>
+                  <a:pt x="4507" y="3672965"/>
+                  <a:pt x="46684" y="3331516"/>
+                </a:cubicBezTo>
+                <a:cubicBezTo>
+                  <a:pt x="127203" y="2664286"/>
+                  <a:pt x="277819" y="2007265"/>
+                  <a:pt x="496065" y="1371196"/>
+                </a:cubicBezTo>
+                <a:cubicBezTo>
+                  <a:pt x="636273" y="966066"/>
+                  <a:pt x="800445" y="573253"/>
+                  <a:pt x="995723" y="196614"/>
+                </a:cubicBezTo>
+                <a:close/>
+              </a:path>
+            </a:pathLst>
+          </a:custGeom>
+        </p:spPr>
+      </p:pic>
+    </p:spTree>
+    <p:extLst>
+      <p:ext uri="{BB962C8B-B14F-4D97-AF65-F5344CB8AC3E}">
+        <p14:creationId xmlns:p14="http://schemas.microsoft.com/office/powerpoint/2010/main" val="2605164555"/>
       </p:ext>
     </p:extLst>
   </p:cSld>

</xml_diff>